<commit_message>
add slides for plotly graphs
</commit_message>
<xml_diff>
--- a/Project3_CA_WildFires.pptx
+++ b/Project3_CA_WildFires.pptx
@@ -5,7 +5,7 @@
     <p:sldMasterId id="2147483648" r:id="rId1"/>
   </p:sldMasterIdLst>
   <p:notesMasterIdLst>
-    <p:notesMasterId r:id="rId10"/>
+    <p:notesMasterId r:id="rId13"/>
   </p:notesMasterIdLst>
   <p:sldIdLst>
     <p:sldId id="256" r:id="rId2"/>
@@ -16,6 +16,9 @@
     <p:sldId id="259" r:id="rId7"/>
     <p:sldId id="257" r:id="rId8"/>
     <p:sldId id="258" r:id="rId9"/>
+    <p:sldId id="265" r:id="rId10"/>
+    <p:sldId id="266" r:id="rId11"/>
+    <p:sldId id="267" r:id="rId12"/>
   </p:sldIdLst>
   <p:sldSz cx="12192000" cy="6858000"/>
   <p:notesSz cx="6858000" cy="9144000"/>
@@ -204,7 +207,7 @@
           <a:p>
             <a:fld id="{CC2CE1C3-CD50-44C9-8579-B138BF86FD83}" type="datetimeFigureOut">
               <a:rPr lang="en-US" smtClean="0"/>
-              <a:t>7/22/2022</a:t>
+              <a:t>7/29/22</a:t>
             </a:fld>
             <a:endParaRPr lang="en-US"/>
           </a:p>
@@ -618,7 +621,7 @@
           <a:p>
             <a:fld id="{AD1B6942-FA69-4AD1-BE7A-FACDCEFC9702}" type="datetimeFigureOut">
               <a:rPr lang="en-US" smtClean="0"/>
-              <a:t>7/22/2022</a:t>
+              <a:t>7/29/22</a:t>
             </a:fld>
             <a:endParaRPr lang="en-US"/>
           </a:p>
@@ -816,7 +819,7 @@
           <a:p>
             <a:fld id="{AD1B6942-FA69-4AD1-BE7A-FACDCEFC9702}" type="datetimeFigureOut">
               <a:rPr lang="en-US" smtClean="0"/>
-              <a:t>7/22/2022</a:t>
+              <a:t>7/29/22</a:t>
             </a:fld>
             <a:endParaRPr lang="en-US"/>
           </a:p>
@@ -1024,7 +1027,7 @@
           <a:p>
             <a:fld id="{AD1B6942-FA69-4AD1-BE7A-FACDCEFC9702}" type="datetimeFigureOut">
               <a:rPr lang="en-US" smtClean="0"/>
-              <a:t>7/22/2022</a:t>
+              <a:t>7/29/22</a:t>
             </a:fld>
             <a:endParaRPr lang="en-US"/>
           </a:p>
@@ -1222,7 +1225,7 @@
           <a:p>
             <a:fld id="{AD1B6942-FA69-4AD1-BE7A-FACDCEFC9702}" type="datetimeFigureOut">
               <a:rPr lang="en-US" smtClean="0"/>
-              <a:t>7/22/2022</a:t>
+              <a:t>7/29/22</a:t>
             </a:fld>
             <a:endParaRPr lang="en-US"/>
           </a:p>
@@ -1497,7 +1500,7 @@
           <a:p>
             <a:fld id="{AD1B6942-FA69-4AD1-BE7A-FACDCEFC9702}" type="datetimeFigureOut">
               <a:rPr lang="en-US" smtClean="0"/>
-              <a:t>7/22/2022</a:t>
+              <a:t>7/29/22</a:t>
             </a:fld>
             <a:endParaRPr lang="en-US"/>
           </a:p>
@@ -1762,7 +1765,7 @@
           <a:p>
             <a:fld id="{AD1B6942-FA69-4AD1-BE7A-FACDCEFC9702}" type="datetimeFigureOut">
               <a:rPr lang="en-US" smtClean="0"/>
-              <a:t>7/22/2022</a:t>
+              <a:t>7/29/22</a:t>
             </a:fld>
             <a:endParaRPr lang="en-US"/>
           </a:p>
@@ -2174,7 +2177,7 @@
           <a:p>
             <a:fld id="{AD1B6942-FA69-4AD1-BE7A-FACDCEFC9702}" type="datetimeFigureOut">
               <a:rPr lang="en-US" smtClean="0"/>
-              <a:t>7/22/2022</a:t>
+              <a:t>7/29/22</a:t>
             </a:fld>
             <a:endParaRPr lang="en-US"/>
           </a:p>
@@ -2315,7 +2318,7 @@
           <a:p>
             <a:fld id="{AD1B6942-FA69-4AD1-BE7A-FACDCEFC9702}" type="datetimeFigureOut">
               <a:rPr lang="en-US" smtClean="0"/>
-              <a:t>7/22/2022</a:t>
+              <a:t>7/29/22</a:t>
             </a:fld>
             <a:endParaRPr lang="en-US"/>
           </a:p>
@@ -2428,7 +2431,7 @@
           <a:p>
             <a:fld id="{AD1B6942-FA69-4AD1-BE7A-FACDCEFC9702}" type="datetimeFigureOut">
               <a:rPr lang="en-US" smtClean="0"/>
-              <a:t>7/22/2022</a:t>
+              <a:t>7/29/22</a:t>
             </a:fld>
             <a:endParaRPr lang="en-US"/>
           </a:p>
@@ -2739,7 +2742,7 @@
           <a:p>
             <a:fld id="{AD1B6942-FA69-4AD1-BE7A-FACDCEFC9702}" type="datetimeFigureOut">
               <a:rPr lang="en-US" smtClean="0"/>
-              <a:t>7/22/2022</a:t>
+              <a:t>7/29/22</a:t>
             </a:fld>
             <a:endParaRPr lang="en-US"/>
           </a:p>
@@ -3027,7 +3030,7 @@
           <a:p>
             <a:fld id="{AD1B6942-FA69-4AD1-BE7A-FACDCEFC9702}" type="datetimeFigureOut">
               <a:rPr lang="en-US" smtClean="0"/>
-              <a:t>7/22/2022</a:t>
+              <a:t>7/29/22</a:t>
             </a:fld>
             <a:endParaRPr lang="en-US"/>
           </a:p>
@@ -3268,7 +3271,7 @@
           <a:p>
             <a:fld id="{AD1B6942-FA69-4AD1-BE7A-FACDCEFC9702}" type="datetimeFigureOut">
               <a:rPr lang="en-US" smtClean="0"/>
-              <a:t>7/22/2022</a:t>
+              <a:t>7/29/22</a:t>
             </a:fld>
             <a:endParaRPr lang="en-US"/>
           </a:p>
@@ -7819,6 +7822,186 @@
 </p:sld>
 </file>
 
+<file path=ppt/slides/slide10.xml><?xml version="1.0" encoding="utf-8"?>
+<p:sld xmlns:a="http://schemas.openxmlformats.org/drawingml/2006/main" xmlns:r="http://schemas.openxmlformats.org/officeDocument/2006/relationships" xmlns:p="http://schemas.openxmlformats.org/presentationml/2006/main">
+  <p:cSld>
+    <p:spTree>
+      <p:nvGrpSpPr>
+        <p:cNvPr id="1" name=""/>
+        <p:cNvGrpSpPr/>
+        <p:nvPr/>
+      </p:nvGrpSpPr>
+      <p:grpSpPr>
+        <a:xfrm>
+          <a:off x="0" y="0"/>
+          <a:ext cx="0" cy="0"/>
+          <a:chOff x="0" y="0"/>
+          <a:chExt cx="0" cy="0"/>
+        </a:xfrm>
+      </p:grpSpPr>
+      <p:sp>
+        <p:nvSpPr>
+          <p:cNvPr id="2" name="Title 1">
+            <a:extLst>
+              <a:ext uri="{FF2B5EF4-FFF2-40B4-BE49-F238E27FC236}">
+                <a16:creationId xmlns:a16="http://schemas.microsoft.com/office/drawing/2014/main" id="{E42912D7-8C1F-B426-6442-3552DDFC59ED}"/>
+              </a:ext>
+            </a:extLst>
+          </p:cNvPr>
+          <p:cNvSpPr>
+            <a:spLocks noGrp="1"/>
+          </p:cNvSpPr>
+          <p:nvPr>
+            <p:ph type="title"/>
+          </p:nvPr>
+        </p:nvSpPr>
+        <p:spPr/>
+        <p:txBody>
+          <a:bodyPr/>
+          <a:lstStyle/>
+          <a:p>
+            <a:endParaRPr lang="en-US"/>
+          </a:p>
+        </p:txBody>
+      </p:sp>
+      <p:pic>
+        <p:nvPicPr>
+          <p:cNvPr id="5" name="Content Placeholder 4" descr="Chart&#10;&#10;Description automatically generated">
+            <a:extLst>
+              <a:ext uri="{FF2B5EF4-FFF2-40B4-BE49-F238E27FC236}">
+                <a16:creationId xmlns:a16="http://schemas.microsoft.com/office/drawing/2014/main" id="{15A1BC20-F607-4243-38BD-1726A6B50F9D}"/>
+              </a:ext>
+            </a:extLst>
+          </p:cNvPr>
+          <p:cNvPicPr>
+            <a:picLocks noGrp="1" noChangeAspect="1"/>
+          </p:cNvPicPr>
+          <p:nvPr>
+            <p:ph idx="1"/>
+          </p:nvPr>
+        </p:nvPicPr>
+        <p:blipFill>
+          <a:blip r:embed="rId2">
+            <a:extLst>
+              <a:ext uri="{28A0092B-C50C-407E-A947-70E740481C1C}">
+                <a14:useLocalDpi xmlns:a14="http://schemas.microsoft.com/office/drawing/2010/main" val="0"/>
+              </a:ext>
+            </a:extLst>
+          </a:blip>
+          <a:stretch>
+            <a:fillRect/>
+          </a:stretch>
+        </p:blipFill>
+        <p:spPr>
+          <a:xfrm>
+            <a:off x="838200" y="2265313"/>
+            <a:ext cx="10515600" cy="3471961"/>
+          </a:xfrm>
+        </p:spPr>
+      </p:pic>
+    </p:spTree>
+    <p:extLst>
+      <p:ext uri="{BB962C8B-B14F-4D97-AF65-F5344CB8AC3E}">
+        <p14:creationId xmlns:p14="http://schemas.microsoft.com/office/powerpoint/2010/main" val="1484548813"/>
+      </p:ext>
+    </p:extLst>
+  </p:cSld>
+  <p:clrMapOvr>
+    <a:masterClrMapping/>
+  </p:clrMapOvr>
+</p:sld>
+</file>
+
+<file path=ppt/slides/slide11.xml><?xml version="1.0" encoding="utf-8"?>
+<p:sld xmlns:a="http://schemas.openxmlformats.org/drawingml/2006/main" xmlns:r="http://schemas.openxmlformats.org/officeDocument/2006/relationships" xmlns:p="http://schemas.openxmlformats.org/presentationml/2006/main">
+  <p:cSld>
+    <p:spTree>
+      <p:nvGrpSpPr>
+        <p:cNvPr id="1" name=""/>
+        <p:cNvGrpSpPr/>
+        <p:nvPr/>
+      </p:nvGrpSpPr>
+      <p:grpSpPr>
+        <a:xfrm>
+          <a:off x="0" y="0"/>
+          <a:ext cx="0" cy="0"/>
+          <a:chOff x="0" y="0"/>
+          <a:chExt cx="0" cy="0"/>
+        </a:xfrm>
+      </p:grpSpPr>
+      <p:sp>
+        <p:nvSpPr>
+          <p:cNvPr id="2" name="Title 1">
+            <a:extLst>
+              <a:ext uri="{FF2B5EF4-FFF2-40B4-BE49-F238E27FC236}">
+                <a16:creationId xmlns:a16="http://schemas.microsoft.com/office/drawing/2014/main" id="{B534CA63-2ECE-0DBC-7E68-911096E2AF45}"/>
+              </a:ext>
+            </a:extLst>
+          </p:cNvPr>
+          <p:cNvSpPr>
+            <a:spLocks noGrp="1"/>
+          </p:cNvSpPr>
+          <p:nvPr>
+            <p:ph type="title"/>
+          </p:nvPr>
+        </p:nvSpPr>
+        <p:spPr/>
+        <p:txBody>
+          <a:bodyPr/>
+          <a:lstStyle/>
+          <a:p>
+            <a:endParaRPr lang="en-US"/>
+          </a:p>
+        </p:txBody>
+      </p:sp>
+      <p:pic>
+        <p:nvPicPr>
+          <p:cNvPr id="5" name="Content Placeholder 4" descr="Diagram&#10;&#10;Description automatically generated with medium confidence">
+            <a:extLst>
+              <a:ext uri="{FF2B5EF4-FFF2-40B4-BE49-F238E27FC236}">
+                <a16:creationId xmlns:a16="http://schemas.microsoft.com/office/drawing/2014/main" id="{29535C43-67E2-CA9E-C70C-9A8243AACD7C}"/>
+              </a:ext>
+            </a:extLst>
+          </p:cNvPr>
+          <p:cNvPicPr>
+            <a:picLocks noGrp="1" noChangeAspect="1"/>
+          </p:cNvPicPr>
+          <p:nvPr>
+            <p:ph idx="1"/>
+          </p:nvPr>
+        </p:nvPicPr>
+        <p:blipFill>
+          <a:blip r:embed="rId2">
+            <a:extLst>
+              <a:ext uri="{28A0092B-C50C-407E-A947-70E740481C1C}">
+                <a14:useLocalDpi xmlns:a14="http://schemas.microsoft.com/office/drawing/2010/main" val="0"/>
+              </a:ext>
+            </a:extLst>
+          </a:blip>
+          <a:stretch>
+            <a:fillRect/>
+          </a:stretch>
+        </p:blipFill>
+        <p:spPr>
+          <a:xfrm>
+            <a:off x="3499979" y="1825625"/>
+            <a:ext cx="5192042" cy="4351338"/>
+          </a:xfrm>
+        </p:spPr>
+      </p:pic>
+    </p:spTree>
+    <p:extLst>
+      <p:ext uri="{BB962C8B-B14F-4D97-AF65-F5344CB8AC3E}">
+        <p14:creationId xmlns:p14="http://schemas.microsoft.com/office/powerpoint/2010/main" val="1345740725"/>
+      </p:ext>
+    </p:extLst>
+  </p:cSld>
+  <p:clrMapOvr>
+    <a:masterClrMapping/>
+  </p:clrMapOvr>
+</p:sld>
+</file>
+
 <file path=ppt/slides/slide2.xml><?xml version="1.0" encoding="utf-8"?>
 <p:sld xmlns:a="http://schemas.openxmlformats.org/drawingml/2006/main" xmlns:r="http://schemas.openxmlformats.org/officeDocument/2006/relationships" xmlns:p="http://schemas.openxmlformats.org/presentationml/2006/main">
   <p:cSld>
@@ -8690,6 +8873,96 @@
     <p:extLst>
       <p:ext uri="{BB962C8B-B14F-4D97-AF65-F5344CB8AC3E}">
         <p14:creationId xmlns:p14="http://schemas.microsoft.com/office/powerpoint/2010/main" val="2379626168"/>
+      </p:ext>
+    </p:extLst>
+  </p:cSld>
+  <p:clrMapOvr>
+    <a:masterClrMapping/>
+  </p:clrMapOvr>
+</p:sld>
+</file>
+
+<file path=ppt/slides/slide9.xml><?xml version="1.0" encoding="utf-8"?>
+<p:sld xmlns:a="http://schemas.openxmlformats.org/drawingml/2006/main" xmlns:r="http://schemas.openxmlformats.org/officeDocument/2006/relationships" xmlns:p="http://schemas.openxmlformats.org/presentationml/2006/main">
+  <p:cSld>
+    <p:spTree>
+      <p:nvGrpSpPr>
+        <p:cNvPr id="1" name=""/>
+        <p:cNvGrpSpPr/>
+        <p:nvPr/>
+      </p:nvGrpSpPr>
+      <p:grpSpPr>
+        <a:xfrm>
+          <a:off x="0" y="0"/>
+          <a:ext cx="0" cy="0"/>
+          <a:chOff x="0" y="0"/>
+          <a:chExt cx="0" cy="0"/>
+        </a:xfrm>
+      </p:grpSpPr>
+      <p:sp>
+        <p:nvSpPr>
+          <p:cNvPr id="2" name="Title 1">
+            <a:extLst>
+              <a:ext uri="{FF2B5EF4-FFF2-40B4-BE49-F238E27FC236}">
+                <a16:creationId xmlns:a16="http://schemas.microsoft.com/office/drawing/2014/main" id="{10768FC4-F365-615B-13FD-5BD8E8BE3BF5}"/>
+              </a:ext>
+            </a:extLst>
+          </p:cNvPr>
+          <p:cNvSpPr>
+            <a:spLocks noGrp="1"/>
+          </p:cNvSpPr>
+          <p:nvPr>
+            <p:ph type="title"/>
+          </p:nvPr>
+        </p:nvSpPr>
+        <p:spPr/>
+        <p:txBody>
+          <a:bodyPr/>
+          <a:lstStyle/>
+          <a:p>
+            <a:endParaRPr lang="en-US" dirty="0"/>
+          </a:p>
+        </p:txBody>
+      </p:sp>
+      <p:pic>
+        <p:nvPicPr>
+          <p:cNvPr id="5" name="Content Placeholder 4" descr="Chart, bar chart&#10;&#10;Description automatically generated">
+            <a:extLst>
+              <a:ext uri="{FF2B5EF4-FFF2-40B4-BE49-F238E27FC236}">
+                <a16:creationId xmlns:a16="http://schemas.microsoft.com/office/drawing/2014/main" id="{D037DB51-D28B-8B14-3D04-A85B29D66ED8}"/>
+              </a:ext>
+            </a:extLst>
+          </p:cNvPr>
+          <p:cNvPicPr>
+            <a:picLocks noGrp="1" noChangeAspect="1"/>
+          </p:cNvPicPr>
+          <p:nvPr>
+            <p:ph idx="1"/>
+          </p:nvPr>
+        </p:nvPicPr>
+        <p:blipFill>
+          <a:blip r:embed="rId2">
+            <a:extLst>
+              <a:ext uri="{28A0092B-C50C-407E-A947-70E740481C1C}">
+                <a14:useLocalDpi xmlns:a14="http://schemas.microsoft.com/office/drawing/2010/main" val="0"/>
+              </a:ext>
+            </a:extLst>
+          </a:blip>
+          <a:stretch>
+            <a:fillRect/>
+          </a:stretch>
+        </p:blipFill>
+        <p:spPr>
+          <a:xfrm>
+            <a:off x="1637722" y="1825625"/>
+            <a:ext cx="8916555" cy="4351338"/>
+          </a:xfrm>
+        </p:spPr>
+      </p:pic>
+    </p:spTree>
+    <p:extLst>
+      <p:ext uri="{BB962C8B-B14F-4D97-AF65-F5344CB8AC3E}">
+        <p14:creationId xmlns:p14="http://schemas.microsoft.com/office/powerpoint/2010/main" val="967499017"/>
       </p:ext>
     </p:extLst>
   </p:cSld>

</xml_diff>

<commit_message>
finishing touches, and cleaned up some unused files
</commit_message>
<xml_diff>
--- a/Project3_CA_WildFires.pptx
+++ b/Project3_CA_WildFires.pptx
@@ -206,7 +206,7 @@
           <a:p>
             <a:fld id="{CC2CE1C3-CD50-44C9-8579-B138BF86FD83}" type="datetimeFigureOut">
               <a:rPr lang="en-US" smtClean="0"/>
-              <a:t>7/29/22</a:t>
+              <a:t>7/30/2022</a:t>
             </a:fld>
             <a:endParaRPr lang="en-US"/>
           </a:p>
@@ -620,7 +620,7 @@
           <a:p>
             <a:fld id="{AD1B6942-FA69-4AD1-BE7A-FACDCEFC9702}" type="datetimeFigureOut">
               <a:rPr lang="en-US" smtClean="0"/>
-              <a:t>7/29/22</a:t>
+              <a:t>7/30/2022</a:t>
             </a:fld>
             <a:endParaRPr lang="en-US"/>
           </a:p>
@@ -818,7 +818,7 @@
           <a:p>
             <a:fld id="{AD1B6942-FA69-4AD1-BE7A-FACDCEFC9702}" type="datetimeFigureOut">
               <a:rPr lang="en-US" smtClean="0"/>
-              <a:t>7/29/22</a:t>
+              <a:t>7/30/2022</a:t>
             </a:fld>
             <a:endParaRPr lang="en-US"/>
           </a:p>
@@ -1026,7 +1026,7 @@
           <a:p>
             <a:fld id="{AD1B6942-FA69-4AD1-BE7A-FACDCEFC9702}" type="datetimeFigureOut">
               <a:rPr lang="en-US" smtClean="0"/>
-              <a:t>7/29/22</a:t>
+              <a:t>7/30/2022</a:t>
             </a:fld>
             <a:endParaRPr lang="en-US"/>
           </a:p>
@@ -1224,7 +1224,7 @@
           <a:p>
             <a:fld id="{AD1B6942-FA69-4AD1-BE7A-FACDCEFC9702}" type="datetimeFigureOut">
               <a:rPr lang="en-US" smtClean="0"/>
-              <a:t>7/29/22</a:t>
+              <a:t>7/30/2022</a:t>
             </a:fld>
             <a:endParaRPr lang="en-US"/>
           </a:p>
@@ -1499,7 +1499,7 @@
           <a:p>
             <a:fld id="{AD1B6942-FA69-4AD1-BE7A-FACDCEFC9702}" type="datetimeFigureOut">
               <a:rPr lang="en-US" smtClean="0"/>
-              <a:t>7/29/22</a:t>
+              <a:t>7/30/2022</a:t>
             </a:fld>
             <a:endParaRPr lang="en-US"/>
           </a:p>
@@ -1764,7 +1764,7 @@
           <a:p>
             <a:fld id="{AD1B6942-FA69-4AD1-BE7A-FACDCEFC9702}" type="datetimeFigureOut">
               <a:rPr lang="en-US" smtClean="0"/>
-              <a:t>7/29/22</a:t>
+              <a:t>7/30/2022</a:t>
             </a:fld>
             <a:endParaRPr lang="en-US"/>
           </a:p>
@@ -2176,7 +2176,7 @@
           <a:p>
             <a:fld id="{AD1B6942-FA69-4AD1-BE7A-FACDCEFC9702}" type="datetimeFigureOut">
               <a:rPr lang="en-US" smtClean="0"/>
-              <a:t>7/29/22</a:t>
+              <a:t>7/30/2022</a:t>
             </a:fld>
             <a:endParaRPr lang="en-US"/>
           </a:p>
@@ -2317,7 +2317,7 @@
           <a:p>
             <a:fld id="{AD1B6942-FA69-4AD1-BE7A-FACDCEFC9702}" type="datetimeFigureOut">
               <a:rPr lang="en-US" smtClean="0"/>
-              <a:t>7/29/22</a:t>
+              <a:t>7/30/2022</a:t>
             </a:fld>
             <a:endParaRPr lang="en-US"/>
           </a:p>
@@ -2430,7 +2430,7 @@
           <a:p>
             <a:fld id="{AD1B6942-FA69-4AD1-BE7A-FACDCEFC9702}" type="datetimeFigureOut">
               <a:rPr lang="en-US" smtClean="0"/>
-              <a:t>7/29/22</a:t>
+              <a:t>7/30/2022</a:t>
             </a:fld>
             <a:endParaRPr lang="en-US"/>
           </a:p>
@@ -2741,7 +2741,7 @@
           <a:p>
             <a:fld id="{AD1B6942-FA69-4AD1-BE7A-FACDCEFC9702}" type="datetimeFigureOut">
               <a:rPr lang="en-US" smtClean="0"/>
-              <a:t>7/29/22</a:t>
+              <a:t>7/30/2022</a:t>
             </a:fld>
             <a:endParaRPr lang="en-US"/>
           </a:p>
@@ -3029,7 +3029,7 @@
           <a:p>
             <a:fld id="{AD1B6942-FA69-4AD1-BE7A-FACDCEFC9702}" type="datetimeFigureOut">
               <a:rPr lang="en-US" smtClean="0"/>
-              <a:t>7/29/22</a:t>
+              <a:t>7/30/2022</a:t>
             </a:fld>
             <a:endParaRPr lang="en-US"/>
           </a:p>
@@ -3270,7 +3270,7 @@
           <a:p>
             <a:fld id="{AD1B6942-FA69-4AD1-BE7A-FACDCEFC9702}" type="datetimeFigureOut">
               <a:rPr lang="en-US" smtClean="0"/>
-              <a:t>7/29/22</a:t>
+              <a:t>7/30/2022</a:t>
             </a:fld>
             <a:endParaRPr lang="en-US"/>
           </a:p>
@@ -8616,7 +8616,20 @@
                 <a:ea typeface="Lato" panose="020F0502020204030203" pitchFamily="34" charset="0"/>
                 <a:cs typeface="Lato" panose="020F0502020204030203" pitchFamily="34" charset="0"/>
               </a:rPr>
-              <a:t>Most fire causes </a:t>
+              <a:t>Most fire causes are unknown.</a:t>
+            </a:r>
+          </a:p>
+          <a:p>
+            <a:r>
+              <a:rPr lang="en-US" sz="2200" dirty="0">
+                <a:solidFill>
+                  <a:srgbClr val="FFFFFF"/>
+                </a:solidFill>
+                <a:latin typeface="Lato" panose="020F0502020204030203" pitchFamily="34" charset="0"/>
+                <a:ea typeface="Lato" panose="020F0502020204030203" pitchFamily="34" charset="0"/>
+                <a:cs typeface="Lato" panose="020F0502020204030203" pitchFamily="34" charset="0"/>
+              </a:rPr>
+              <a:t>Fires across the state have been progressively increasing </a:t>
             </a:r>
             <a:r>
               <a:rPr lang="en-US" sz="2200">
@@ -8627,18 +8640,8 @@
                 <a:ea typeface="Lato" panose="020F0502020204030203" pitchFamily="34" charset="0"/>
                 <a:cs typeface="Lato" panose="020F0502020204030203" pitchFamily="34" charset="0"/>
               </a:rPr>
-              <a:t>are unknown.</a:t>
+              <a:t>from 2014-2022</a:t>
             </a:r>
-            <a:endParaRPr lang="en-US" sz="2200" dirty="0">
-              <a:solidFill>
-                <a:srgbClr val="FFFFFF"/>
-              </a:solidFill>
-              <a:latin typeface="Lato" panose="020F0502020204030203" pitchFamily="34" charset="0"/>
-              <a:ea typeface="Lato" panose="020F0502020204030203" pitchFamily="34" charset="0"/>
-              <a:cs typeface="Lato" panose="020F0502020204030203" pitchFamily="34" charset="0"/>
-            </a:endParaRPr>
-          </a:p>
-          <a:p>
             <a:r>
               <a:rPr lang="en-US" sz="2200" dirty="0">
                 <a:solidFill>
@@ -8648,7 +8651,7 @@
                 <a:ea typeface="Lato" panose="020F0502020204030203" pitchFamily="34" charset="0"/>
                 <a:cs typeface="Lato" panose="020F0502020204030203" pitchFamily="34" charset="0"/>
               </a:rPr>
-              <a:t>Fires across the state have been progressively increasing from 2012-2022, with a large increase over the past 3 years due to rising temperatures and longer droughts.</a:t>
+              <a:t>, with a large increase over the past 3 years due to rising temperatures and longer droughts.</a:t>
             </a:r>
           </a:p>
           <a:p>
@@ -9099,7 +9102,7 @@
                 <a:ea typeface="Lato" panose="020F0502020204030203" pitchFamily="34" charset="0"/>
                 <a:cs typeface="Lato" panose="020F0502020204030203" pitchFamily="34" charset="0"/>
               </a:rPr>
-              <a:t>ildfires in California from 2012 to date exploring the number of fires per year, burn length and location using several datasets.</a:t>
+              <a:t>ildfires in California from 2014 to date exploring the number of fires per year, burn length and location using several datasets.</a:t>
             </a:r>
           </a:p>
         </p:txBody>

</xml_diff>